<commit_message>
update em flowchart figure
</commit_message>
<xml_diff>
--- a/fig/images.pptx
+++ b/fig/images.pptx
@@ -8824,7 +8824,7 @@
             <a:pPr algn="ctr"/>
             <a:r>
               <a:rPr lang="en-US" sz="1200" dirty="0"/>
-              <a:t>Print with settings</a:t>
+              <a:t>Print square wall with settings</a:t>
             </a:r>
           </a:p>
         </p:txBody>
@@ -8871,7 +8871,7 @@
             <a:pPr algn="ctr"/>
             <a:r>
               <a:rPr lang="en-US" sz="1200" dirty="0"/>
-              <a:t>Set settings to: EM=1 PW=0.4</a:t>
+              <a:t>Set settings: EM=1 PW=0.4</a:t>
             </a:r>
           </a:p>
         </p:txBody>
@@ -8918,7 +8918,7 @@
             <a:pPr algn="ctr"/>
             <a:r>
               <a:rPr lang="en-US" sz="1200" dirty="0"/>
-              <a:t>Measure Width</a:t>
+              <a:t>Measure Path Width</a:t>
             </a:r>
           </a:p>
         </p:txBody>
@@ -8937,8 +8937,8 @@
         </p:nvSpPr>
         <p:spPr>
           <a:xfrm>
-            <a:off x="4847974" y="294629"/>
-            <a:ext cx="1057355" cy="461665"/>
+            <a:off x="4817969" y="208497"/>
+            <a:ext cx="1057355" cy="600164"/>
           </a:xfrm>
           <a:prstGeom prst="rect">
             <a:avLst/>
@@ -8951,9 +8951,17 @@
           </a:bodyPr>
           <a:lstStyle/>
           <a:p>
-            <a:r>
-              <a:rPr lang="en-US" sz="1200" dirty="0"/>
-              <a:t>Wall width = 0.4 mm?</a:t>
+            <a:pPr algn="ctr"/>
+            <a:r>
+              <a:rPr lang="en-US" sz="1100" dirty="0"/>
+              <a:t>Does the path width </a:t>
+            </a:r>
+          </a:p>
+          <a:p>
+            <a:pPr algn="ctr"/>
+            <a:r>
+              <a:rPr lang="en-US" sz="1100" dirty="0"/>
+              <a:t>= 0.4 mm?</a:t>
             </a:r>
           </a:p>
         </p:txBody>
@@ -9409,15 +9417,15 @@
           </p:cNvPr>
           <p:cNvCxnSpPr>
             <a:cxnSpLocks/>
-            <a:stCxn id="16" idx="3"/>
+            <a:stCxn id="6" idx="3"/>
             <a:endCxn id="17" idx="1"/>
           </p:cNvCxnSpPr>
           <p:nvPr/>
         </p:nvCxnSpPr>
         <p:spPr>
-          <a:xfrm flipV="1">
-            <a:off x="5905329" y="522240"/>
-            <a:ext cx="462248" cy="3222"/>
+          <a:xfrm>
+            <a:off x="5898979" y="522239"/>
+            <a:ext cx="468598" cy="1"/>
           </a:xfrm>
           <a:prstGeom prst="straightConnector1">
             <a:avLst/>
@@ -9556,7 +9564,7 @@
           <a:lstStyle/>
           <a:p>
             <a:r>
-              <a:rPr lang="en-US" sz="1200" dirty="0"/>
+              <a:rPr lang="en-US" sz="1200" i="1" dirty="0"/>
               <a:t>No</a:t>
             </a:r>
           </a:p>
@@ -9576,7 +9584,7 @@
         </p:nvSpPr>
         <p:spPr>
           <a:xfrm>
-            <a:off x="5887914" y="290535"/>
+            <a:off x="5873097" y="285360"/>
             <a:ext cx="441146" cy="276999"/>
           </a:xfrm>
           <a:prstGeom prst="rect">
@@ -9591,7 +9599,7 @@
           <a:lstStyle/>
           <a:p>
             <a:r>
-              <a:rPr lang="en-US" sz="1200" dirty="0"/>
+              <a:rPr lang="en-US" sz="1200" i="1" dirty="0"/>
               <a:t>Yes</a:t>
             </a:r>
           </a:p>

</xml_diff>